<commit_message>
model deployment and others
</commit_message>
<xml_diff>
--- a/slides/ML - Module 4 - Unsupervised Machine Learning.pptx
+++ b/slides/ML - Module 4 - Unsupervised Machine Learning.pptx
@@ -273,7 +273,7 @@
           <a:p>
             <a:fld id="{1E72A6B1-85D5-4955-A616-DF87C3C0F9B2}" type="datetimeFigureOut">
               <a:rPr lang="en-GB" smtClean="0"/>
-              <a:t>30/01/2026</a:t>
+              <a:t>01/02/2026</a:t>
             </a:fld>
             <a:endParaRPr lang="en-GB"/>
           </a:p>
@@ -473,7 +473,7 @@
           <a:p>
             <a:fld id="{1E72A6B1-85D5-4955-A616-DF87C3C0F9B2}" type="datetimeFigureOut">
               <a:rPr lang="en-GB" smtClean="0"/>
-              <a:t>30/01/2026</a:t>
+              <a:t>01/02/2026</a:t>
             </a:fld>
             <a:endParaRPr lang="en-GB"/>
           </a:p>
@@ -683,7 +683,7 @@
           <a:p>
             <a:fld id="{1E72A6B1-85D5-4955-A616-DF87C3C0F9B2}" type="datetimeFigureOut">
               <a:rPr lang="en-GB" smtClean="0"/>
-              <a:t>30/01/2026</a:t>
+              <a:t>01/02/2026</a:t>
             </a:fld>
             <a:endParaRPr lang="en-GB"/>
           </a:p>
@@ -883,7 +883,7 @@
           <a:p>
             <a:fld id="{1E72A6B1-85D5-4955-A616-DF87C3C0F9B2}" type="datetimeFigureOut">
               <a:rPr lang="en-GB" smtClean="0"/>
-              <a:t>30/01/2026</a:t>
+              <a:t>01/02/2026</a:t>
             </a:fld>
             <a:endParaRPr lang="en-GB"/>
           </a:p>
@@ -1159,7 +1159,7 @@
           <a:p>
             <a:fld id="{1E72A6B1-85D5-4955-A616-DF87C3C0F9B2}" type="datetimeFigureOut">
               <a:rPr lang="en-GB" smtClean="0"/>
-              <a:t>30/01/2026</a:t>
+              <a:t>01/02/2026</a:t>
             </a:fld>
             <a:endParaRPr lang="en-GB"/>
           </a:p>
@@ -1427,7 +1427,7 @@
           <a:p>
             <a:fld id="{1E72A6B1-85D5-4955-A616-DF87C3C0F9B2}" type="datetimeFigureOut">
               <a:rPr lang="en-GB" smtClean="0"/>
-              <a:t>30/01/2026</a:t>
+              <a:t>01/02/2026</a:t>
             </a:fld>
             <a:endParaRPr lang="en-GB"/>
           </a:p>
@@ -1842,7 +1842,7 @@
           <a:p>
             <a:fld id="{1E72A6B1-85D5-4955-A616-DF87C3C0F9B2}" type="datetimeFigureOut">
               <a:rPr lang="en-GB" smtClean="0"/>
-              <a:t>30/01/2026</a:t>
+              <a:t>01/02/2026</a:t>
             </a:fld>
             <a:endParaRPr lang="en-GB"/>
           </a:p>
@@ -1984,7 +1984,7 @@
           <a:p>
             <a:fld id="{1E72A6B1-85D5-4955-A616-DF87C3C0F9B2}" type="datetimeFigureOut">
               <a:rPr lang="en-GB" smtClean="0"/>
-              <a:t>30/01/2026</a:t>
+              <a:t>01/02/2026</a:t>
             </a:fld>
             <a:endParaRPr lang="en-GB"/>
           </a:p>
@@ -2097,7 +2097,7 @@
           <a:p>
             <a:fld id="{1E72A6B1-85D5-4955-A616-DF87C3C0F9B2}" type="datetimeFigureOut">
               <a:rPr lang="en-GB" smtClean="0"/>
-              <a:t>30/01/2026</a:t>
+              <a:t>01/02/2026</a:t>
             </a:fld>
             <a:endParaRPr lang="en-GB"/>
           </a:p>
@@ -2410,7 +2410,7 @@
           <a:p>
             <a:fld id="{1E72A6B1-85D5-4955-A616-DF87C3C0F9B2}" type="datetimeFigureOut">
               <a:rPr lang="en-GB" smtClean="0"/>
-              <a:t>30/01/2026</a:t>
+              <a:t>01/02/2026</a:t>
             </a:fld>
             <a:endParaRPr lang="en-GB"/>
           </a:p>
@@ -2699,7 +2699,7 @@
           <a:p>
             <a:fld id="{1E72A6B1-85D5-4955-A616-DF87C3C0F9B2}" type="datetimeFigureOut">
               <a:rPr lang="en-GB" smtClean="0"/>
-              <a:t>30/01/2026</a:t>
+              <a:t>01/02/2026</a:t>
             </a:fld>
             <a:endParaRPr lang="en-GB"/>
           </a:p>
@@ -2942,7 +2942,7 @@
           <a:p>
             <a:fld id="{1E72A6B1-85D5-4955-A616-DF87C3C0F9B2}" type="datetimeFigureOut">
               <a:rPr lang="en-GB" smtClean="0"/>
-              <a:t>30/01/2026</a:t>
+              <a:t>01/02/2026</a:t>
             </a:fld>
             <a:endParaRPr lang="en-GB"/>
           </a:p>
@@ -28636,7 +28636,7 @@
           <p:nvPr>
             <p:extLst>
               <p:ext uri="{D42A27DB-BD31-4B8C-83A1-F6EECF244321}">
-                <p14:modId xmlns:p14="http://schemas.microsoft.com/office/powerpoint/2010/main" val="2820394390"/>
+                <p14:modId xmlns:p14="http://schemas.microsoft.com/office/powerpoint/2010/main" val="550267818"/>
               </p:ext>
             </p:extLst>
           </p:nvPr>
@@ -29183,7 +29183,7 @@
                       </a:pPr>
                       <a:r>
                         <a:rPr lang="en-GB" sz="1400" dirty="0"/>
-                        <a:t>Bread, Milk, Cola</a:t>
+                        <a:t>Milk, Bread, Cola</a:t>
                       </a:r>
                     </a:p>
                   </a:txBody>
@@ -29296,7 +29296,7 @@
                       </a:pPr>
                       <a:r>
                         <a:rPr lang="en-GB" sz="1400" dirty="0"/>
-                        <a:t>Bread, Milk, Eggs</a:t>
+                        <a:t>Eggs, Milk, Bread</a:t>
                       </a:r>
                     </a:p>
                   </a:txBody>
@@ -30060,8 +30060,8 @@
         </p:nvSpPr>
         <p:spPr>
           <a:xfrm>
-            <a:off x="3867586" y="2429519"/>
-            <a:ext cx="2547174" cy="523220"/>
+            <a:off x="3783243" y="2429519"/>
+            <a:ext cx="2962878" cy="523220"/>
           </a:xfrm>
           <a:prstGeom prst="rect">
             <a:avLst/>
@@ -30077,7 +30077,7 @@
             <a:pPr algn="ctr"/>
             <a:r>
               <a:rPr lang="en-IN" sz="1400" dirty="0"/>
-              <a:t>Step 2: Sort items in each transaction (Descending order)</a:t>
+              <a:t>Step 2: Sort items in each transaction (Descending frequency order)</a:t>
             </a:r>
             <a:endParaRPr lang="en-GB" sz="1400" dirty="0"/>
           </a:p>
@@ -30813,95 +30813,6 @@
       </p:graphicFrame>
       <p:sp>
         <p:nvSpPr>
-          <p:cNvPr id="14" name="TextBox 13">
-            <a:extLst>
-              <a:ext uri="{FF2B5EF4-FFF2-40B4-BE49-F238E27FC236}">
-                <a16:creationId xmlns:a16="http://schemas.microsoft.com/office/drawing/2014/main" id="{E18DDAC4-5BBD-B6E4-015A-8E007CF356CC}"/>
-              </a:ext>
-            </a:extLst>
-          </p:cNvPr>
-          <p:cNvSpPr txBox="1"/>
-          <p:nvPr/>
-        </p:nvSpPr>
-        <p:spPr>
-          <a:xfrm>
-            <a:off x="6999348" y="566678"/>
-            <a:ext cx="3624444" cy="2862322"/>
-          </a:xfrm>
-          <a:prstGeom prst="rect">
-            <a:avLst/>
-          </a:prstGeom>
-          <a:noFill/>
-        </p:spPr>
-        <p:txBody>
-          <a:bodyPr wrap="square">
-            <a:spAutoFit/>
-          </a:bodyPr>
-          <a:lstStyle/>
-          <a:p>
-            <a:r>
-              <a:rPr lang="en-GB" dirty="0"/>
-              <a:t>NULL</a:t>
-            </a:r>
-          </a:p>
-          <a:p>
-            <a:r>
-              <a:rPr lang="en-GB" dirty="0"/>
-              <a:t> ├─ Bread(4)</a:t>
-            </a:r>
-          </a:p>
-          <a:p>
-            <a:r>
-              <a:rPr lang="en-GB" dirty="0"/>
-              <a:t> │   └─ Milk(3)</a:t>
-            </a:r>
-          </a:p>
-          <a:p>
-            <a:r>
-              <a:rPr lang="en-GB" dirty="0"/>
-              <a:t> │       ├─ Cola(1)</a:t>
-            </a:r>
-          </a:p>
-          <a:p>
-            <a:r>
-              <a:rPr lang="en-GB" dirty="0"/>
-              <a:t> │       └─ Eggs(1)</a:t>
-            </a:r>
-          </a:p>
-          <a:p>
-            <a:r>
-              <a:rPr lang="en-GB" dirty="0"/>
-              <a:t> │   └─ Cola(1)</a:t>
-            </a:r>
-          </a:p>
-          <a:p>
-            <a:r>
-              <a:rPr lang="en-GB" dirty="0"/>
-              <a:t> │       └─ Eggs(1)</a:t>
-            </a:r>
-          </a:p>
-          <a:p>
-            <a:r>
-              <a:rPr lang="en-GB" dirty="0"/>
-              <a:t> └─ Milk(1)</a:t>
-            </a:r>
-          </a:p>
-          <a:p>
-            <a:r>
-              <a:rPr lang="en-GB" dirty="0"/>
-              <a:t>     └─ Cola(1)</a:t>
-            </a:r>
-          </a:p>
-          <a:p>
-            <a:r>
-              <a:rPr lang="en-GB" dirty="0"/>
-              <a:t>         └─ Eggs(1)</a:t>
-            </a:r>
-          </a:p>
-        </p:txBody>
-      </p:sp>
-      <p:sp>
-        <p:nvSpPr>
           <p:cNvPr id="15" name="TextBox 14">
             <a:extLst>
               <a:ext uri="{FF2B5EF4-FFF2-40B4-BE49-F238E27FC236}">
@@ -30968,7 +30879,11 @@
             <a:pPr algn="ctr"/>
             <a:r>
               <a:rPr lang="en-IN" sz="1400" dirty="0"/>
-              <a:t>Step 4: Mining Frequent Patterns</a:t>
+              <a:t>Step 4: Mining Frequent </a:t>
+            </a:r>
+            <a:r>
+              <a:rPr lang="en-IN" sz="1400"/>
+              <a:t>Patterns Examples</a:t>
             </a:r>
             <a:endParaRPr lang="en-GB" sz="1400" dirty="0"/>
           </a:p>
@@ -30989,7 +30904,7 @@
         <p:spPr>
           <a:xfrm>
             <a:off x="9239978" y="678488"/>
-            <a:ext cx="2596036" cy="2462213"/>
+            <a:ext cx="2596036" cy="3754874"/>
           </a:xfrm>
           <a:prstGeom prst="rect">
             <a:avLst/>
@@ -31017,40 +30932,45 @@
             <a:endParaRPr lang="en-IN" sz="1400" dirty="0"/>
           </a:p>
           <a:p>
-            <a:r>
-              <a:rPr lang="en-IN" sz="1400" dirty="0"/>
-              <a:t>Conditional pattern base</a:t>
-            </a:r>
-          </a:p>
-          <a:p>
             <a:pPr marL="285750" indent="-285750">
-              <a:buFontTx/>
-              <a:buChar char="-"/>
+              <a:buFont typeface="Arial" panose="020B0604020202020204" pitchFamily="34" charset="0"/>
+              <a:buChar char="•"/>
             </a:pPr>
             <a:r>
-              <a:rPr lang="en-IN" sz="1400" dirty="0"/>
-              <a:t>Bread -&gt; Milk -&gt; Cola</a:t>
+              <a:rPr lang="en-US" sz="1400" dirty="0"/>
+              <a:t>Look at all paths in the FP-Tree that contain Cola</a:t>
             </a:r>
           </a:p>
           <a:p>
             <a:pPr marL="285750" indent="-285750">
-              <a:buFontTx/>
-              <a:buChar char="-"/>
+              <a:buFont typeface="Arial" panose="020B0604020202020204" pitchFamily="34" charset="0"/>
+              <a:buChar char="•"/>
             </a:pPr>
             <a:r>
-              <a:rPr lang="en-IN" sz="1400" dirty="0"/>
-              <a:t>Bread -&gt; Cola</a:t>
+              <a:rPr lang="en-US" sz="1400" dirty="0"/>
+              <a:t>Collect the items that appear before Cola in those paths</a:t>
             </a:r>
           </a:p>
           <a:p>
             <a:pPr marL="285750" indent="-285750">
-              <a:buFontTx/>
-              <a:buChar char="-"/>
+              <a:buFont typeface="Arial" panose="020B0604020202020204" pitchFamily="34" charset="0"/>
+              <a:buChar char="•"/>
             </a:pPr>
             <a:r>
-              <a:rPr lang="en-IN" sz="1400" dirty="0"/>
-              <a:t>Milk -&gt; Cola</a:t>
-            </a:r>
+              <a:rPr lang="en-US" sz="1400" dirty="0"/>
+              <a:t>These paths form the conditional pattern base of Cola</a:t>
+            </a:r>
+          </a:p>
+          <a:p>
+            <a:pPr marL="285750" indent="-285750">
+              <a:buFont typeface="Arial" panose="020B0604020202020204" pitchFamily="34" charset="0"/>
+              <a:buChar char="•"/>
+            </a:pPr>
+            <a:r>
+              <a:rPr lang="en-US" sz="1400" dirty="0"/>
+              <a:t>From these paths, find combinations that satisfy minimum support</a:t>
+            </a:r>
+            <a:endParaRPr lang="en-IN" sz="1400" dirty="0"/>
           </a:p>
           <a:p>
             <a:endParaRPr lang="en-IN" sz="1400" dirty="0"/>
@@ -31113,8 +31033,8 @@
         </p:nvSpPr>
         <p:spPr>
           <a:xfrm>
-            <a:off x="9239978" y="3283989"/>
-            <a:ext cx="2596036" cy="2462213"/>
+            <a:off x="9239978" y="4486675"/>
+            <a:ext cx="2596036" cy="2246769"/>
           </a:xfrm>
           <a:prstGeom prst="rect">
             <a:avLst/>
@@ -31135,11 +31055,8 @@
             <a:pPr algn="ctr"/>
             <a:r>
               <a:rPr lang="en-IN" sz="1400" b="1" dirty="0"/>
-              <a:t>Patterns with Eggs</a:t>
-            </a:r>
-          </a:p>
-          <a:p>
-            <a:endParaRPr lang="en-IN" sz="1400" dirty="0"/>
+              <a:t>Repeat for Eggs</a:t>
+            </a:r>
           </a:p>
           <a:p>
             <a:r>
@@ -31351,6 +31268,154 @@
               <a:t>Itemsets</a:t>
             </a:r>
             <a:endParaRPr lang="en-GB" sz="1400" dirty="0"/>
+          </a:p>
+        </p:txBody>
+      </p:sp>
+      <p:pic>
+        <p:nvPicPr>
+          <p:cNvPr id="3" name="Picture 2">
+            <a:extLst>
+              <a:ext uri="{FF2B5EF4-FFF2-40B4-BE49-F238E27FC236}">
+                <a16:creationId xmlns:a16="http://schemas.microsoft.com/office/drawing/2014/main" id="{95A6F2F8-90BC-A13F-E245-632DCA9FF9F0}"/>
+              </a:ext>
+            </a:extLst>
+          </p:cNvPr>
+          <p:cNvPicPr>
+            <a:picLocks noChangeAspect="1"/>
+          </p:cNvPicPr>
+          <p:nvPr/>
+        </p:nvPicPr>
+        <p:blipFill>
+          <a:blip r:embed="rId2"/>
+          <a:stretch>
+            <a:fillRect/>
+          </a:stretch>
+        </p:blipFill>
+        <p:spPr>
+          <a:xfrm>
+            <a:off x="6708123" y="489912"/>
+            <a:ext cx="2325028" cy="3201384"/>
+          </a:xfrm>
+          <a:prstGeom prst="rect">
+            <a:avLst/>
+          </a:prstGeom>
+        </p:spPr>
+      </p:pic>
+      <p:cxnSp>
+        <p:nvCxnSpPr>
+          <p:cNvPr id="21" name="Straight Arrow Connector 20">
+            <a:extLst>
+              <a:ext uri="{FF2B5EF4-FFF2-40B4-BE49-F238E27FC236}">
+                <a16:creationId xmlns:a16="http://schemas.microsoft.com/office/drawing/2014/main" id="{E8A08ECF-30D1-F1F3-CBBE-CA8676466EBD}"/>
+              </a:ext>
+            </a:extLst>
+          </p:cNvPr>
+          <p:cNvCxnSpPr>
+            <a:cxnSpLocks/>
+          </p:cNvCxnSpPr>
+          <p:nvPr/>
+        </p:nvCxnSpPr>
+        <p:spPr>
+          <a:xfrm flipH="1">
+            <a:off x="6547965" y="1597454"/>
+            <a:ext cx="1388469" cy="3323554"/>
+          </a:xfrm>
+          <a:prstGeom prst="straightConnector1">
+            <a:avLst/>
+          </a:prstGeom>
+          <a:ln>
+            <a:tailEnd type="triangle"/>
+          </a:ln>
+        </p:spPr>
+        <p:style>
+          <a:lnRef idx="1">
+            <a:schemeClr val="accent1"/>
+          </a:lnRef>
+          <a:fillRef idx="0">
+            <a:schemeClr val="accent1"/>
+          </a:fillRef>
+          <a:effectRef idx="0">
+            <a:schemeClr val="accent1"/>
+          </a:effectRef>
+          <a:fontRef idx="minor">
+            <a:schemeClr val="tx1"/>
+          </a:fontRef>
+        </p:style>
+      </p:cxnSp>
+      <p:sp>
+        <p:nvSpPr>
+          <p:cNvPr id="22" name="TextBox 21">
+            <a:extLst>
+              <a:ext uri="{FF2B5EF4-FFF2-40B4-BE49-F238E27FC236}">
+                <a16:creationId xmlns:a16="http://schemas.microsoft.com/office/drawing/2014/main" id="{04D96957-561D-9EA1-1EBA-F0E297F2C334}"/>
+              </a:ext>
+            </a:extLst>
+          </p:cNvPr>
+          <p:cNvSpPr txBox="1"/>
+          <p:nvPr/>
+        </p:nvSpPr>
+        <p:spPr>
+          <a:xfrm>
+            <a:off x="3899328" y="4953661"/>
+            <a:ext cx="2768939" cy="1384995"/>
+          </a:xfrm>
+          <a:prstGeom prst="rect">
+            <a:avLst/>
+          </a:prstGeom>
+          <a:solidFill>
+            <a:schemeClr val="accent4">
+              <a:lumMod val="60000"/>
+              <a:lumOff val="40000"/>
+            </a:schemeClr>
+          </a:solidFill>
+        </p:spPr>
+        <p:txBody>
+          <a:bodyPr wrap="square" rtlCol="0">
+            <a:spAutoFit/>
+          </a:bodyPr>
+          <a:lstStyle/>
+          <a:p>
+            <a:r>
+              <a:rPr lang="en-IN" sz="1200" dirty="0"/>
+              <a:t>Sample interpretation:</a:t>
+            </a:r>
+          </a:p>
+          <a:p>
+            <a:r>
+              <a:rPr lang="en-GB" sz="1200" dirty="0"/>
+              <a:t>NULL → Bread(4) → Milk(3) → Cola(1)</a:t>
+            </a:r>
+          </a:p>
+          <a:p>
+            <a:pPr marL="285750" indent="-285750">
+              <a:buFontTx/>
+              <a:buChar char="-"/>
+            </a:pPr>
+            <a:r>
+              <a:rPr lang="en-GB" sz="1200" dirty="0"/>
+              <a:t>Bread(4): 4 transactions</a:t>
+            </a:r>
+          </a:p>
+          <a:p>
+            <a:pPr marL="285750" indent="-285750">
+              <a:buFontTx/>
+              <a:buChar char="-"/>
+            </a:pPr>
+            <a:r>
+              <a:rPr lang="en-GB" sz="1200" dirty="0"/>
+              <a:t>Bread(4) → Milk(3): Out of 4 bread transactions, 3 also have milk</a:t>
+            </a:r>
+          </a:p>
+          <a:p>
+            <a:pPr marL="285750" indent="-285750">
+              <a:buFontTx/>
+              <a:buChar char="-"/>
+            </a:pPr>
+            <a:r>
+              <a:rPr lang="en-GB" sz="1200" dirty="0"/>
+              <a:t>Bread(4) → Milk(3) → Cola(1): Out of the above 3, one also has cola</a:t>
+            </a:r>
+            <a:endParaRPr lang="en-IN" sz="1200" dirty="0"/>
           </a:p>
         </p:txBody>
       </p:sp>

</xml_diff>